<commit_message>
slightly modified excluding "Tip" and visually
</commit_message>
<xml_diff>
--- a/figures/manual_figures.pptx
+++ b/figures/manual_figures.pptx
@@ -107,6 +107,11 @@
       </a:defRPr>
     </a:lvl9pPr>
   </p:defaultTextStyle>
+  <p:extLst>
+    <p:ext uri="{EFAFB233-063F-42B5-8137-9DF3F51BA10A}">
+      <p15:sldGuideLst xmlns:p15="http://schemas.microsoft.com/office/powerpoint/2012/main"/>
+    </p:ext>
+  </p:extLst>
 </p:presentation>
 </file>
 
@@ -192,7 +197,7 @@
           <a:p>
             <a:fld id="{9BE14856-88DD-744A-9FB7-3830681E7195}" type="datetimeFigureOut">
               <a:rPr lang="en-US" smtClean="0"/>
-              <a:t>7/21/23</a:t>
+              <a:t>8/1/23</a:t>
             </a:fld>
             <a:endParaRPr lang="en-US"/>
           </a:p>
@@ -690,7 +695,7 @@
           <a:p>
             <a:fld id="{9AFA58C7-16A3-DE4A-8BA1-DC642EC38F33}" type="datetimeFigureOut">
               <a:rPr lang="en-US" smtClean="0"/>
-              <a:t>7/21/23</a:t>
+              <a:t>8/1/23</a:t>
             </a:fld>
             <a:endParaRPr lang="en-US"/>
           </a:p>
@@ -888,7 +893,7 @@
           <a:p>
             <a:fld id="{9AFA58C7-16A3-DE4A-8BA1-DC642EC38F33}" type="datetimeFigureOut">
               <a:rPr lang="en-US" smtClean="0"/>
-              <a:t>7/21/23</a:t>
+              <a:t>8/1/23</a:t>
             </a:fld>
             <a:endParaRPr lang="en-US"/>
           </a:p>
@@ -1096,7 +1101,7 @@
           <a:p>
             <a:fld id="{9AFA58C7-16A3-DE4A-8BA1-DC642EC38F33}" type="datetimeFigureOut">
               <a:rPr lang="en-US" smtClean="0"/>
-              <a:t>7/21/23</a:t>
+              <a:t>8/1/23</a:t>
             </a:fld>
             <a:endParaRPr lang="en-US"/>
           </a:p>
@@ -1294,7 +1299,7 @@
           <a:p>
             <a:fld id="{9AFA58C7-16A3-DE4A-8BA1-DC642EC38F33}" type="datetimeFigureOut">
               <a:rPr lang="en-US" smtClean="0"/>
-              <a:t>7/21/23</a:t>
+              <a:t>8/1/23</a:t>
             </a:fld>
             <a:endParaRPr lang="en-US"/>
           </a:p>
@@ -1569,7 +1574,7 @@
           <a:p>
             <a:fld id="{9AFA58C7-16A3-DE4A-8BA1-DC642EC38F33}" type="datetimeFigureOut">
               <a:rPr lang="en-US" smtClean="0"/>
-              <a:t>7/21/23</a:t>
+              <a:t>8/1/23</a:t>
             </a:fld>
             <a:endParaRPr lang="en-US"/>
           </a:p>
@@ -1834,7 +1839,7 @@
           <a:p>
             <a:fld id="{9AFA58C7-16A3-DE4A-8BA1-DC642EC38F33}" type="datetimeFigureOut">
               <a:rPr lang="en-US" smtClean="0"/>
-              <a:t>7/21/23</a:t>
+              <a:t>8/1/23</a:t>
             </a:fld>
             <a:endParaRPr lang="en-US"/>
           </a:p>
@@ -2246,7 +2251,7 @@
           <a:p>
             <a:fld id="{9AFA58C7-16A3-DE4A-8BA1-DC642EC38F33}" type="datetimeFigureOut">
               <a:rPr lang="en-US" smtClean="0"/>
-              <a:t>7/21/23</a:t>
+              <a:t>8/1/23</a:t>
             </a:fld>
             <a:endParaRPr lang="en-US"/>
           </a:p>
@@ -2387,7 +2392,7 @@
           <a:p>
             <a:fld id="{9AFA58C7-16A3-DE4A-8BA1-DC642EC38F33}" type="datetimeFigureOut">
               <a:rPr lang="en-US" smtClean="0"/>
-              <a:t>7/21/23</a:t>
+              <a:t>8/1/23</a:t>
             </a:fld>
             <a:endParaRPr lang="en-US"/>
           </a:p>
@@ -2500,7 +2505,7 @@
           <a:p>
             <a:fld id="{9AFA58C7-16A3-DE4A-8BA1-DC642EC38F33}" type="datetimeFigureOut">
               <a:rPr lang="en-US" smtClean="0"/>
-              <a:t>7/21/23</a:t>
+              <a:t>8/1/23</a:t>
             </a:fld>
             <a:endParaRPr lang="en-US"/>
           </a:p>
@@ -2811,7 +2816,7 @@
           <a:p>
             <a:fld id="{9AFA58C7-16A3-DE4A-8BA1-DC642EC38F33}" type="datetimeFigureOut">
               <a:rPr lang="en-US" smtClean="0"/>
-              <a:t>7/21/23</a:t>
+              <a:t>8/1/23</a:t>
             </a:fld>
             <a:endParaRPr lang="en-US"/>
           </a:p>
@@ -3099,7 +3104,7 @@
           <a:p>
             <a:fld id="{9AFA58C7-16A3-DE4A-8BA1-DC642EC38F33}" type="datetimeFigureOut">
               <a:rPr lang="en-US" smtClean="0"/>
-              <a:t>7/21/23</a:t>
+              <a:t>8/1/23</a:t>
             </a:fld>
             <a:endParaRPr lang="en-US"/>
           </a:p>
@@ -3340,7 +3345,7 @@
           <a:p>
             <a:fld id="{9AFA58C7-16A3-DE4A-8BA1-DC642EC38F33}" type="datetimeFigureOut">
               <a:rPr lang="en-US" smtClean="0"/>
-              <a:t>7/21/23</a:t>
+              <a:t>8/1/23</a:t>
             </a:fld>
             <a:endParaRPr lang="en-US"/>
           </a:p>
@@ -3759,73 +3764,6 @@
       </p:grpSpPr>
       <p:sp>
         <p:nvSpPr>
-          <p:cNvPr id="14" name="TextBox 13">
-            <a:extLst>
-              <a:ext uri="{FF2B5EF4-FFF2-40B4-BE49-F238E27FC236}">
-                <a16:creationId xmlns:a16="http://schemas.microsoft.com/office/drawing/2014/main" id="{FDA2DA79-F172-117F-2FAA-CF05B50C725B}"/>
-              </a:ext>
-            </a:extLst>
-          </p:cNvPr>
-          <p:cNvSpPr txBox="1"/>
-          <p:nvPr/>
-        </p:nvSpPr>
-        <p:spPr>
-          <a:xfrm>
-            <a:off x="4505027" y="5342701"/>
-            <a:ext cx="4543425" cy="369332"/>
-          </a:xfrm>
-          <a:prstGeom prst="rect">
-            <a:avLst/>
-          </a:prstGeom>
-          <a:noFill/>
-        </p:spPr>
-        <p:txBody>
-          <a:bodyPr wrap="square" rtlCol="0">
-            <a:spAutoFit/>
-          </a:bodyPr>
-          <a:lstStyle/>
-          <a:p>
-            <a:pPr algn="ctr"/>
-            <a:r>
-              <a:rPr lang="en-US" b="1" dirty="0">
-                <a:latin typeface="Avenir Book" panose="02000503020000020003" pitchFamily="2" charset="0"/>
-              </a:rPr>
-              <a:t>Utility functions</a:t>
-            </a:r>
-          </a:p>
-        </p:txBody>
-      </p:sp>
-      <p:pic>
-        <p:nvPicPr>
-          <p:cNvPr id="17" name="Picture 16">
-            <a:extLst>
-              <a:ext uri="{FF2B5EF4-FFF2-40B4-BE49-F238E27FC236}">
-                <a16:creationId xmlns:a16="http://schemas.microsoft.com/office/drawing/2014/main" id="{6DE7C6BE-E9E0-8B43-9902-DC721974A0E5}"/>
-              </a:ext>
-            </a:extLst>
-          </p:cNvPr>
-          <p:cNvPicPr>
-            <a:picLocks noChangeAspect="1"/>
-          </p:cNvPicPr>
-          <p:nvPr/>
-        </p:nvPicPr>
-        <p:blipFill rotWithShape="1">
-          <a:blip r:embed="rId3"/>
-          <a:srcRect l="6612"/>
-          <a:stretch/>
-        </p:blipFill>
-        <p:spPr>
-          <a:xfrm>
-            <a:off x="522360" y="19527"/>
-            <a:ext cx="11318552" cy="1309334"/>
-          </a:xfrm>
-          <a:prstGeom prst="rect">
-            <a:avLst/>
-          </a:prstGeom>
-        </p:spPr>
-      </p:pic>
-      <p:sp>
-        <p:nvSpPr>
           <p:cNvPr id="18" name="Rounded Rectangle 17">
             <a:extLst>
               <a:ext uri="{FF2B5EF4-FFF2-40B4-BE49-F238E27FC236}">
@@ -3838,8 +3776,8 @@
         </p:nvSpPr>
         <p:spPr>
           <a:xfrm rot="5400000">
-            <a:off x="5773783" y="-4406537"/>
-            <a:ext cx="644433" cy="12192002"/>
+            <a:off x="5089921" y="-4946797"/>
+            <a:ext cx="2011680" cy="12048398"/>
           </a:xfrm>
           <a:prstGeom prst="roundRect">
             <a:avLst/>
@@ -3874,6 +3812,46 @@
           <a:lstStyle/>
           <a:p>
             <a:pPr algn="ctr"/>
+            <a:endParaRPr lang="en-US" i="1" dirty="0">
+              <a:solidFill>
+                <a:schemeClr val="tx1"/>
+              </a:solidFill>
+            </a:endParaRPr>
+          </a:p>
+          <a:p>
+            <a:pPr algn="ctr"/>
+            <a:endParaRPr lang="en-US" i="1" dirty="0">
+              <a:solidFill>
+                <a:schemeClr val="tx1"/>
+              </a:solidFill>
+            </a:endParaRPr>
+          </a:p>
+          <a:p>
+            <a:pPr algn="ctr"/>
+            <a:endParaRPr lang="en-US" i="1" dirty="0">
+              <a:solidFill>
+                <a:schemeClr val="tx1"/>
+              </a:solidFill>
+            </a:endParaRPr>
+          </a:p>
+          <a:p>
+            <a:pPr algn="ctr"/>
+            <a:endParaRPr lang="en-US" i="1" dirty="0">
+              <a:solidFill>
+                <a:schemeClr val="tx1"/>
+              </a:solidFill>
+            </a:endParaRPr>
+          </a:p>
+          <a:p>
+            <a:pPr algn="ctr"/>
+            <a:endParaRPr lang="en-US" i="1" dirty="0">
+              <a:solidFill>
+                <a:schemeClr val="tx1"/>
+              </a:solidFill>
+            </a:endParaRPr>
+          </a:p>
+          <a:p>
+            <a:pPr algn="ctr"/>
             <a:r>
               <a:rPr lang="en-US" i="1" dirty="0" err="1">
                 <a:solidFill>
@@ -3906,6 +3884,73 @@
       </p:sp>
       <p:sp>
         <p:nvSpPr>
+          <p:cNvPr id="14" name="TextBox 13">
+            <a:extLst>
+              <a:ext uri="{FF2B5EF4-FFF2-40B4-BE49-F238E27FC236}">
+                <a16:creationId xmlns:a16="http://schemas.microsoft.com/office/drawing/2014/main" id="{FDA2DA79-F172-117F-2FAA-CF05B50C725B}"/>
+              </a:ext>
+            </a:extLst>
+          </p:cNvPr>
+          <p:cNvSpPr txBox="1"/>
+          <p:nvPr/>
+        </p:nvSpPr>
+        <p:spPr>
+          <a:xfrm>
+            <a:off x="4505027" y="5398358"/>
+            <a:ext cx="4543425" cy="369332"/>
+          </a:xfrm>
+          <a:prstGeom prst="rect">
+            <a:avLst/>
+          </a:prstGeom>
+          <a:noFill/>
+        </p:spPr>
+        <p:txBody>
+          <a:bodyPr wrap="square" rtlCol="0">
+            <a:spAutoFit/>
+          </a:bodyPr>
+          <a:lstStyle/>
+          <a:p>
+            <a:pPr algn="ctr"/>
+            <a:r>
+              <a:rPr lang="en-US" b="1" dirty="0">
+                <a:latin typeface="Avenir Book" panose="02000503020000020003" pitchFamily="2" charset="0"/>
+              </a:rPr>
+              <a:t>Utility functions</a:t>
+            </a:r>
+          </a:p>
+        </p:txBody>
+      </p:sp>
+      <p:pic>
+        <p:nvPicPr>
+          <p:cNvPr id="17" name="Picture 16">
+            <a:extLst>
+              <a:ext uri="{FF2B5EF4-FFF2-40B4-BE49-F238E27FC236}">
+                <a16:creationId xmlns:a16="http://schemas.microsoft.com/office/drawing/2014/main" id="{6DE7C6BE-E9E0-8B43-9902-DC721974A0E5}"/>
+              </a:ext>
+            </a:extLst>
+          </p:cNvPr>
+          <p:cNvPicPr>
+            <a:picLocks noChangeAspect="1"/>
+          </p:cNvPicPr>
+          <p:nvPr/>
+        </p:nvPicPr>
+        <p:blipFill rotWithShape="1">
+          <a:blip r:embed="rId3"/>
+          <a:srcRect l="6612"/>
+          <a:stretch/>
+        </p:blipFill>
+        <p:spPr>
+          <a:xfrm>
+            <a:off x="522360" y="106988"/>
+            <a:ext cx="11318552" cy="1309334"/>
+          </a:xfrm>
+          <a:prstGeom prst="rect">
+            <a:avLst/>
+          </a:prstGeom>
+        </p:spPr>
+      </p:pic>
+      <p:sp>
+        <p:nvSpPr>
           <p:cNvPr id="19" name="Right Arrow 18">
             <a:extLst>
               <a:ext uri="{FF2B5EF4-FFF2-40B4-BE49-F238E27FC236}">
@@ -3918,8 +3963,8 @@
         </p:nvSpPr>
         <p:spPr>
           <a:xfrm rot="5400000">
-            <a:off x="5852132" y="1959406"/>
-            <a:ext cx="182881" cy="304852"/>
+            <a:off x="5855730" y="2018661"/>
+            <a:ext cx="175686" cy="304852"/>
           </a:xfrm>
           <a:prstGeom prst="rightArrow">
             <a:avLst/>
@@ -3968,8 +4013,8 @@
         </p:nvGrpSpPr>
         <p:grpSpPr>
           <a:xfrm>
-            <a:off x="-2" y="2211976"/>
-            <a:ext cx="12192002" cy="1705241"/>
+            <a:off x="70713" y="2267633"/>
+            <a:ext cx="12060667" cy="1705241"/>
             <a:chOff x="1683547" y="828673"/>
             <a:chExt cx="5000033" cy="3843340"/>
           </a:xfrm>
@@ -4086,7 +4131,7 @@
         </p:nvGrpSpPr>
         <p:grpSpPr>
           <a:xfrm>
-            <a:off x="4078587" y="2530269"/>
+            <a:off x="4078587" y="2585926"/>
             <a:ext cx="4056705" cy="1267560"/>
             <a:chOff x="228656" y="2799391"/>
             <a:chExt cx="4056705" cy="1267560"/>
@@ -4260,7 +4305,7 @@
         </p:nvGrpSpPr>
         <p:grpSpPr>
           <a:xfrm>
-            <a:off x="10941" y="2535369"/>
+            <a:off x="10941" y="2591026"/>
             <a:ext cx="4056705" cy="759481"/>
             <a:chOff x="10941" y="2700834"/>
             <a:chExt cx="4056705" cy="759481"/>
@@ -4376,7 +4421,7 @@
         </p:nvGrpSpPr>
         <p:grpSpPr>
           <a:xfrm>
-            <a:off x="9126583" y="2535369"/>
+            <a:off x="9126583" y="2591026"/>
             <a:ext cx="2815103" cy="1266930"/>
             <a:chOff x="9126583" y="2700834"/>
             <a:chExt cx="2815103" cy="1266930"/>
@@ -4543,8 +4588,8 @@
         </p:nvGrpSpPr>
         <p:grpSpPr>
           <a:xfrm>
-            <a:off x="-72043" y="4130205"/>
-            <a:ext cx="12264042" cy="2514436"/>
+            <a:off x="-482" y="4185862"/>
+            <a:ext cx="12120440" cy="2514436"/>
             <a:chOff x="1654003" y="828669"/>
             <a:chExt cx="5029577" cy="5019023"/>
           </a:xfrm>
@@ -4655,7 +4700,7 @@
         </p:nvGrpSpPr>
         <p:grpSpPr>
           <a:xfrm>
-            <a:off x="431946" y="4683955"/>
+            <a:off x="431946" y="4739612"/>
             <a:ext cx="2613556" cy="1626374"/>
             <a:chOff x="423855" y="4983649"/>
             <a:chExt cx="2613556" cy="1626374"/>
@@ -4890,7 +4935,7 @@
         </p:nvSpPr>
         <p:spPr>
           <a:xfrm rot="5400000">
-            <a:off x="5852131" y="3860389"/>
+            <a:off x="5852131" y="3916046"/>
             <a:ext cx="182881" cy="304852"/>
           </a:xfrm>
           <a:prstGeom prst="rightArrow">
@@ -4940,7 +4985,7 @@
         </p:nvGrpSpPr>
         <p:grpSpPr>
           <a:xfrm>
-            <a:off x="3410402" y="4683955"/>
+            <a:off x="3410402" y="4739612"/>
             <a:ext cx="2613556" cy="738664"/>
             <a:chOff x="3410402" y="5137175"/>
             <a:chExt cx="2613556" cy="738664"/>
@@ -5063,7 +5108,7 @@
         </p:nvGrpSpPr>
         <p:grpSpPr>
           <a:xfrm>
-            <a:off x="6366048" y="4706356"/>
+            <a:off x="6366048" y="4762013"/>
             <a:ext cx="2613556" cy="730154"/>
             <a:chOff x="5907457" y="5142862"/>
             <a:chExt cx="2613556" cy="730154"/>
@@ -5180,7 +5225,7 @@
         </p:nvGrpSpPr>
         <p:grpSpPr>
           <a:xfrm>
-            <a:off x="9227356" y="4702557"/>
+            <a:off x="9227356" y="4758214"/>
             <a:ext cx="2613556" cy="746458"/>
             <a:chOff x="9213543" y="5033351"/>
             <a:chExt cx="2613556" cy="746458"/>
@@ -5297,7 +5342,7 @@
         </p:nvSpPr>
         <p:spPr>
           <a:xfrm>
-            <a:off x="3283132" y="5739845"/>
+            <a:off x="3283132" y="5795502"/>
             <a:ext cx="8836826" cy="523220"/>
           </a:xfrm>
           <a:prstGeom prst="rect">
@@ -5312,10 +5357,16 @@
           <a:lstStyle/>
           <a:p>
             <a:r>
+              <a:rPr lang="en-US" sz="1400" i="1">
+                <a:latin typeface="Avenir Book" panose="02000503020000020003" pitchFamily="2" charset="0"/>
+              </a:rPr>
+              <a:t>If </a:t>
+            </a:r>
+            <a:r>
               <a:rPr lang="en-US" sz="1400" i="1" dirty="0">
                 <a:latin typeface="Avenir Book" panose="02000503020000020003" pitchFamily="2" charset="0"/>
               </a:rPr>
-              <a:t>Tip: If pattern seems </a:t>
+              <a:t>pattern seems </a:t>
             </a:r>
             <a:r>
               <a:rPr lang="en-US" sz="1400" b="1" i="1" dirty="0">
@@ -5364,7 +5415,7 @@
         </p:nvSpPr>
         <p:spPr>
           <a:xfrm>
-            <a:off x="857130" y="3421367"/>
+            <a:off x="857130" y="3477024"/>
             <a:ext cx="2364323" cy="369332"/>
           </a:xfrm>
           <a:prstGeom prst="rect">

</xml_diff>

<commit_message>
incorporated PAS edits and comments
</commit_message>
<xml_diff>
--- a/figures/manual_figures.pptx
+++ b/figures/manual_figures.pptx
@@ -198,7 +198,7 @@
           <a:p>
             <a:fld id="{9BE14856-88DD-744A-9FB7-3830681E7195}" type="datetimeFigureOut">
               <a:rPr lang="en-US" smtClean="0"/>
-              <a:t>8/3/23</a:t>
+              <a:t>9/9/23</a:t>
             </a:fld>
             <a:endParaRPr lang="en-US"/>
           </a:p>
@@ -762,7 +762,7 @@
           <a:p>
             <a:fld id="{9AFA58C7-16A3-DE4A-8BA1-DC642EC38F33}" type="datetimeFigureOut">
               <a:rPr lang="en-US" smtClean="0"/>
-              <a:t>8/3/23</a:t>
+              <a:t>9/9/23</a:t>
             </a:fld>
             <a:endParaRPr lang="en-US"/>
           </a:p>
@@ -960,7 +960,7 @@
           <a:p>
             <a:fld id="{9AFA58C7-16A3-DE4A-8BA1-DC642EC38F33}" type="datetimeFigureOut">
               <a:rPr lang="en-US" smtClean="0"/>
-              <a:t>8/3/23</a:t>
+              <a:t>9/9/23</a:t>
             </a:fld>
             <a:endParaRPr lang="en-US"/>
           </a:p>
@@ -1168,7 +1168,7 @@
           <a:p>
             <a:fld id="{9AFA58C7-16A3-DE4A-8BA1-DC642EC38F33}" type="datetimeFigureOut">
               <a:rPr lang="en-US" smtClean="0"/>
-              <a:t>8/3/23</a:t>
+              <a:t>9/9/23</a:t>
             </a:fld>
             <a:endParaRPr lang="en-US"/>
           </a:p>
@@ -1366,7 +1366,7 @@
           <a:p>
             <a:fld id="{9AFA58C7-16A3-DE4A-8BA1-DC642EC38F33}" type="datetimeFigureOut">
               <a:rPr lang="en-US" smtClean="0"/>
-              <a:t>8/3/23</a:t>
+              <a:t>9/9/23</a:t>
             </a:fld>
             <a:endParaRPr lang="en-US"/>
           </a:p>
@@ -1641,7 +1641,7 @@
           <a:p>
             <a:fld id="{9AFA58C7-16A3-DE4A-8BA1-DC642EC38F33}" type="datetimeFigureOut">
               <a:rPr lang="en-US" smtClean="0"/>
-              <a:t>8/3/23</a:t>
+              <a:t>9/9/23</a:t>
             </a:fld>
             <a:endParaRPr lang="en-US"/>
           </a:p>
@@ -1906,7 +1906,7 @@
           <a:p>
             <a:fld id="{9AFA58C7-16A3-DE4A-8BA1-DC642EC38F33}" type="datetimeFigureOut">
               <a:rPr lang="en-US" smtClean="0"/>
-              <a:t>8/3/23</a:t>
+              <a:t>9/9/23</a:t>
             </a:fld>
             <a:endParaRPr lang="en-US"/>
           </a:p>
@@ -2318,7 +2318,7 @@
           <a:p>
             <a:fld id="{9AFA58C7-16A3-DE4A-8BA1-DC642EC38F33}" type="datetimeFigureOut">
               <a:rPr lang="en-US" smtClean="0"/>
-              <a:t>8/3/23</a:t>
+              <a:t>9/9/23</a:t>
             </a:fld>
             <a:endParaRPr lang="en-US"/>
           </a:p>
@@ -2459,7 +2459,7 @@
           <a:p>
             <a:fld id="{9AFA58C7-16A3-DE4A-8BA1-DC642EC38F33}" type="datetimeFigureOut">
               <a:rPr lang="en-US" smtClean="0"/>
-              <a:t>8/3/23</a:t>
+              <a:t>9/9/23</a:t>
             </a:fld>
             <a:endParaRPr lang="en-US"/>
           </a:p>
@@ -2572,7 +2572,7 @@
           <a:p>
             <a:fld id="{9AFA58C7-16A3-DE4A-8BA1-DC642EC38F33}" type="datetimeFigureOut">
               <a:rPr lang="en-US" smtClean="0"/>
-              <a:t>8/3/23</a:t>
+              <a:t>9/9/23</a:t>
             </a:fld>
             <a:endParaRPr lang="en-US"/>
           </a:p>
@@ -2883,7 +2883,7 @@
           <a:p>
             <a:fld id="{9AFA58C7-16A3-DE4A-8BA1-DC642EC38F33}" type="datetimeFigureOut">
               <a:rPr lang="en-US" smtClean="0"/>
-              <a:t>8/3/23</a:t>
+              <a:t>9/9/23</a:t>
             </a:fld>
             <a:endParaRPr lang="en-US"/>
           </a:p>
@@ -3171,7 +3171,7 @@
           <a:p>
             <a:fld id="{9AFA58C7-16A3-DE4A-8BA1-DC642EC38F33}" type="datetimeFigureOut">
               <a:rPr lang="en-US" smtClean="0"/>
-              <a:t>8/3/23</a:t>
+              <a:t>9/9/23</a:t>
             </a:fld>
             <a:endParaRPr lang="en-US"/>
           </a:p>
@@ -3412,7 +3412,7 @@
           <a:p>
             <a:fld id="{9AFA58C7-16A3-DE4A-8BA1-DC642EC38F33}" type="datetimeFigureOut">
               <a:rPr lang="en-US" smtClean="0"/>
-              <a:t>8/3/23</a:t>
+              <a:t>9/9/23</a:t>
             </a:fld>
             <a:endParaRPr lang="en-US"/>
           </a:p>
@@ -4003,13 +4003,13 @@
         </p:nvPicPr>
         <p:blipFill rotWithShape="1">
           <a:blip r:embed="rId3"/>
-          <a:srcRect l="6612"/>
+          <a:srcRect l="6968"/>
           <a:stretch/>
         </p:blipFill>
         <p:spPr>
           <a:xfrm>
-            <a:off x="522360" y="106988"/>
-            <a:ext cx="11318552" cy="1309334"/>
+            <a:off x="308008" y="122741"/>
+            <a:ext cx="11633678" cy="1350940"/>
           </a:xfrm>
           <a:prstGeom prst="rect">
             <a:avLst/>
@@ -5409,8 +5409,8 @@
         </p:nvSpPr>
         <p:spPr>
           <a:xfrm>
-            <a:off x="3283132" y="6177078"/>
-            <a:ext cx="8836826" cy="523220"/>
+            <a:off x="3221453" y="6073598"/>
+            <a:ext cx="8836826" cy="584775"/>
           </a:xfrm>
           <a:prstGeom prst="rect">
             <a:avLst/>
@@ -5424,37 +5424,37 @@
           <a:lstStyle/>
           <a:p>
             <a:r>
-              <a:rPr lang="en-US" sz="1400" i="1" dirty="0">
+              <a:rPr lang="en-US" sz="1600" i="1" dirty="0">
                 <a:latin typeface="Avenir Book" panose="02000503020000020003" pitchFamily="2" charset="0"/>
               </a:rPr>
               <a:t>If pattern seems </a:t>
             </a:r>
             <a:r>
-              <a:rPr lang="en-US" sz="1400" b="1" i="1" dirty="0">
+              <a:rPr lang="en-US" sz="1600" b="1" i="1" dirty="0">
                 <a:latin typeface="Avenir Book" panose="02000503020000020003" pitchFamily="2" charset="0"/>
               </a:rPr>
               <a:t>non-monotone</a:t>
             </a:r>
             <a:r>
-              <a:rPr lang="en-US" sz="1400" i="1" dirty="0">
+              <a:rPr lang="en-US" sz="1600" i="1" dirty="0">
                 <a:latin typeface="Avenir Book" panose="02000503020000020003" pitchFamily="2" charset="0"/>
               </a:rPr>
               <a:t> → run diagnostics on all partially observed covariates jointly, if </a:t>
             </a:r>
             <a:r>
-              <a:rPr lang="en-US" sz="1400" b="1" i="1" dirty="0">
+              <a:rPr lang="en-US" sz="1600" b="1" i="1" dirty="0">
                 <a:latin typeface="Avenir Book" panose="02000503020000020003" pitchFamily="2" charset="0"/>
               </a:rPr>
               <a:t>monotone</a:t>
             </a:r>
             <a:r>
-              <a:rPr lang="en-US" sz="1400" i="1" dirty="0">
+              <a:rPr lang="en-US" sz="1600" i="1" dirty="0">
                 <a:latin typeface="Avenir Book" panose="02000503020000020003" pitchFamily="2" charset="0"/>
               </a:rPr>
               <a:t> consider running diagnostics on each partially observed covariate individually </a:t>
             </a:r>
             <a:r>
-              <a:rPr lang="en-US" sz="1400" i="1" dirty="0">
+              <a:rPr lang="en-US" sz="1600" i="1" dirty="0">
                 <a:latin typeface="Avenir Black" panose="02000503020000020003" pitchFamily="2" charset="0"/>
               </a:rPr>
               <a:t> </a:t>

</xml_diff>

<commit_message>
minor correction to border alignment Figure 1
</commit_message>
<xml_diff>
--- a/figures/manual_figures.pptx
+++ b/figures/manual_figures.pptx
@@ -198,7 +198,7 @@
           <a:p>
             <a:fld id="{9BE14856-88DD-744A-9FB7-3830681E7195}" type="datetimeFigureOut">
               <a:rPr lang="en-US" smtClean="0"/>
-              <a:t>9/9/23</a:t>
+              <a:t>9/15/23</a:t>
             </a:fld>
             <a:endParaRPr lang="en-US"/>
           </a:p>
@@ -762,7 +762,7 @@
           <a:p>
             <a:fld id="{9AFA58C7-16A3-DE4A-8BA1-DC642EC38F33}" type="datetimeFigureOut">
               <a:rPr lang="en-US" smtClean="0"/>
-              <a:t>9/9/23</a:t>
+              <a:t>9/15/23</a:t>
             </a:fld>
             <a:endParaRPr lang="en-US"/>
           </a:p>
@@ -960,7 +960,7 @@
           <a:p>
             <a:fld id="{9AFA58C7-16A3-DE4A-8BA1-DC642EC38F33}" type="datetimeFigureOut">
               <a:rPr lang="en-US" smtClean="0"/>
-              <a:t>9/9/23</a:t>
+              <a:t>9/15/23</a:t>
             </a:fld>
             <a:endParaRPr lang="en-US"/>
           </a:p>
@@ -1168,7 +1168,7 @@
           <a:p>
             <a:fld id="{9AFA58C7-16A3-DE4A-8BA1-DC642EC38F33}" type="datetimeFigureOut">
               <a:rPr lang="en-US" smtClean="0"/>
-              <a:t>9/9/23</a:t>
+              <a:t>9/15/23</a:t>
             </a:fld>
             <a:endParaRPr lang="en-US"/>
           </a:p>
@@ -1366,7 +1366,7 @@
           <a:p>
             <a:fld id="{9AFA58C7-16A3-DE4A-8BA1-DC642EC38F33}" type="datetimeFigureOut">
               <a:rPr lang="en-US" smtClean="0"/>
-              <a:t>9/9/23</a:t>
+              <a:t>9/15/23</a:t>
             </a:fld>
             <a:endParaRPr lang="en-US"/>
           </a:p>
@@ -1641,7 +1641,7 @@
           <a:p>
             <a:fld id="{9AFA58C7-16A3-DE4A-8BA1-DC642EC38F33}" type="datetimeFigureOut">
               <a:rPr lang="en-US" smtClean="0"/>
-              <a:t>9/9/23</a:t>
+              <a:t>9/15/23</a:t>
             </a:fld>
             <a:endParaRPr lang="en-US"/>
           </a:p>
@@ -1906,7 +1906,7 @@
           <a:p>
             <a:fld id="{9AFA58C7-16A3-DE4A-8BA1-DC642EC38F33}" type="datetimeFigureOut">
               <a:rPr lang="en-US" smtClean="0"/>
-              <a:t>9/9/23</a:t>
+              <a:t>9/15/23</a:t>
             </a:fld>
             <a:endParaRPr lang="en-US"/>
           </a:p>
@@ -2318,7 +2318,7 @@
           <a:p>
             <a:fld id="{9AFA58C7-16A3-DE4A-8BA1-DC642EC38F33}" type="datetimeFigureOut">
               <a:rPr lang="en-US" smtClean="0"/>
-              <a:t>9/9/23</a:t>
+              <a:t>9/15/23</a:t>
             </a:fld>
             <a:endParaRPr lang="en-US"/>
           </a:p>
@@ -2459,7 +2459,7 @@
           <a:p>
             <a:fld id="{9AFA58C7-16A3-DE4A-8BA1-DC642EC38F33}" type="datetimeFigureOut">
               <a:rPr lang="en-US" smtClean="0"/>
-              <a:t>9/9/23</a:t>
+              <a:t>9/15/23</a:t>
             </a:fld>
             <a:endParaRPr lang="en-US"/>
           </a:p>
@@ -2572,7 +2572,7 @@
           <a:p>
             <a:fld id="{9AFA58C7-16A3-DE4A-8BA1-DC642EC38F33}" type="datetimeFigureOut">
               <a:rPr lang="en-US" smtClean="0"/>
-              <a:t>9/9/23</a:t>
+              <a:t>9/15/23</a:t>
             </a:fld>
             <a:endParaRPr lang="en-US"/>
           </a:p>
@@ -2883,7 +2883,7 @@
           <a:p>
             <a:fld id="{9AFA58C7-16A3-DE4A-8BA1-DC642EC38F33}" type="datetimeFigureOut">
               <a:rPr lang="en-US" smtClean="0"/>
-              <a:t>9/9/23</a:t>
+              <a:t>9/15/23</a:t>
             </a:fld>
             <a:endParaRPr lang="en-US"/>
           </a:p>
@@ -3171,7 +3171,7 @@
           <a:p>
             <a:fld id="{9AFA58C7-16A3-DE4A-8BA1-DC642EC38F33}" type="datetimeFigureOut">
               <a:rPr lang="en-US" smtClean="0"/>
-              <a:t>9/9/23</a:t>
+              <a:t>9/15/23</a:t>
             </a:fld>
             <a:endParaRPr lang="en-US"/>
           </a:p>
@@ -3412,7 +3412,7 @@
           <a:p>
             <a:fld id="{9AFA58C7-16A3-DE4A-8BA1-DC642EC38F33}" type="datetimeFigureOut">
               <a:rPr lang="en-US" smtClean="0"/>
-              <a:t>9/9/23</a:t>
+              <a:t>9/15/23</a:t>
             </a:fld>
             <a:endParaRPr lang="en-US"/>
           </a:p>
@@ -4656,9 +4656,9 @@
         <p:grpSpPr>
           <a:xfrm>
             <a:off x="121416" y="4185862"/>
-            <a:ext cx="12120440" cy="2514436"/>
+            <a:ext cx="12049244" cy="2514436"/>
             <a:chOff x="1654003" y="828669"/>
-            <a:chExt cx="5029577" cy="5019023"/>
+            <a:chExt cx="5000033" cy="5019023"/>
           </a:xfrm>
         </p:grpSpPr>
         <p:sp>
@@ -4676,7 +4676,7 @@
           <p:spPr>
             <a:xfrm>
               <a:off x="1683547" y="828669"/>
-              <a:ext cx="5000033" cy="5019023"/>
+              <a:ext cx="4954189" cy="5019023"/>
             </a:xfrm>
             <a:prstGeom prst="roundRect">
               <a:avLst/>

</xml_diff>